<commit_message>
fixed not being able to push issues
</commit_message>
<xml_diff>
--- a/presentation/Optimizing Strategies with Reinforcement Learning.pptx
+++ b/presentation/Optimizing Strategies with Reinforcement Learning.pptx
@@ -16253,7 +16253,7 @@
 </file>
 
 <file path=ppt/slides/slide29.xml><?xml version="1.0" encoding="utf-8"?>
-<p:sld xmlns:a="http://schemas.openxmlformats.org/drawingml/2006/main" xmlns:r="http://schemas.openxmlformats.org/officeDocument/2006/relationships" xmlns:p="http://schemas.openxmlformats.org/presentationml/2006/main">
+<p:sld xmlns:a="http://schemas.openxmlformats.org/drawingml/2006/main" xmlns:r="http://schemas.openxmlformats.org/officeDocument/2006/relationships" xmlns:p="http://schemas.openxmlformats.org/presentationml/2006/main" show="0">
   <p:cSld>
     <p:spTree>
       <p:nvGrpSpPr>
@@ -16480,7 +16480,7 @@
 </file>
 
 <file path=ppt/slides/slide30.xml><?xml version="1.0" encoding="utf-8"?>
-<p:sld xmlns:a="http://schemas.openxmlformats.org/drawingml/2006/main" xmlns:r="http://schemas.openxmlformats.org/officeDocument/2006/relationships" xmlns:p="http://schemas.openxmlformats.org/presentationml/2006/main">
+<p:sld xmlns:a="http://schemas.openxmlformats.org/drawingml/2006/main" xmlns:r="http://schemas.openxmlformats.org/officeDocument/2006/relationships" xmlns:p="http://schemas.openxmlformats.org/presentationml/2006/main" show="0">
   <p:cSld>
     <p:spTree>
       <p:nvGrpSpPr>
@@ -16603,7 +16603,7 @@
 </file>
 
 <file path=ppt/slides/slide31.xml><?xml version="1.0" encoding="utf-8"?>
-<p:sld xmlns:a="http://schemas.openxmlformats.org/drawingml/2006/main" xmlns:r="http://schemas.openxmlformats.org/officeDocument/2006/relationships" xmlns:p="http://schemas.openxmlformats.org/presentationml/2006/main">
+<p:sld xmlns:a="http://schemas.openxmlformats.org/drawingml/2006/main" xmlns:r="http://schemas.openxmlformats.org/officeDocument/2006/relationships" xmlns:p="http://schemas.openxmlformats.org/presentationml/2006/main" show="0">
   <p:cSld>
     <p:spTree>
       <p:nvGrpSpPr>
@@ -16726,7 +16726,7 @@
 </file>
 
 <file path=ppt/slides/slide32.xml><?xml version="1.0" encoding="utf-8"?>
-<p:sld xmlns:a="http://schemas.openxmlformats.org/drawingml/2006/main" xmlns:r="http://schemas.openxmlformats.org/officeDocument/2006/relationships" xmlns:p="http://schemas.openxmlformats.org/presentationml/2006/main">
+<p:sld xmlns:a="http://schemas.openxmlformats.org/drawingml/2006/main" xmlns:r="http://schemas.openxmlformats.org/officeDocument/2006/relationships" xmlns:p="http://schemas.openxmlformats.org/presentationml/2006/main" show="0">
   <p:cSld>
     <p:spTree>
       <p:nvGrpSpPr>
@@ -16842,7 +16842,7 @@
 </file>
 
 <file path=ppt/slides/slide33.xml><?xml version="1.0" encoding="utf-8"?>
-<p:sld xmlns:a="http://schemas.openxmlformats.org/drawingml/2006/main" xmlns:r="http://schemas.openxmlformats.org/officeDocument/2006/relationships" xmlns:p="http://schemas.openxmlformats.org/presentationml/2006/main">
+<p:sld xmlns:a="http://schemas.openxmlformats.org/drawingml/2006/main" xmlns:r="http://schemas.openxmlformats.org/officeDocument/2006/relationships" xmlns:p="http://schemas.openxmlformats.org/presentationml/2006/main" show="0">
   <p:cSld>
     <p:spTree>
       <p:nvGrpSpPr>

</xml_diff>

<commit_message>
added dag, fix errors
</commit_message>
<xml_diff>
--- a/presentation/Optimizing Strategies with Reinforcement Learning.pptx
+++ b/presentation/Optimizing Strategies with Reinforcement Learning.pptx
@@ -229,7 +229,7 @@
           <a:p>
             <a:fld id="{0D041FD0-D915-4EC7-8384-5AFD352B34A1}" type="datetimeFigureOut">
               <a:rPr lang="en-US" smtClean="0"/>
-              <a:t>10/9/24</a:t>
+              <a:t>11/4/24</a:t>
             </a:fld>
             <a:endParaRPr lang="en-US"/>
           </a:p>
@@ -7189,7 +7189,7 @@
           <a:p>
             <a:fld id="{02AC24A9-CCB6-4F8D-B8DB-C2F3692CFA5A}" type="datetimeFigureOut">
               <a:rPr lang="en-US" smtClean="0"/>
-              <a:t>10/9/24</a:t>
+              <a:t>11/4/24</a:t>
             </a:fld>
             <a:endParaRPr lang="en-US" dirty="0"/>
           </a:p>
@@ -7559,7 +7559,7 @@
           <a:p>
             <a:fld id="{02AC24A9-CCB6-4F8D-B8DB-C2F3692CFA5A}" type="datetimeFigureOut">
               <a:rPr lang="en-US" smtClean="0"/>
-              <a:t>10/9/24</a:t>
+              <a:t>11/4/24</a:t>
             </a:fld>
             <a:endParaRPr lang="en-US"/>
           </a:p>
@@ -7768,7 +7768,7 @@
           <a:p>
             <a:fld id="{02AC24A9-CCB6-4F8D-B8DB-C2F3692CFA5A}" type="datetimeFigureOut">
               <a:rPr lang="en-US" smtClean="0"/>
-              <a:t>10/9/24</a:t>
+              <a:t>11/4/24</a:t>
             </a:fld>
             <a:endParaRPr lang="en-US"/>
           </a:p>
@@ -8240,7 +8240,7 @@
           <a:p>
             <a:fld id="{02AC24A9-CCB6-4F8D-B8DB-C2F3692CFA5A}" type="datetimeFigureOut">
               <a:rPr lang="en-US" smtClean="0"/>
-              <a:t>10/9/24</a:t>
+              <a:t>11/4/24</a:t>
             </a:fld>
             <a:endParaRPr lang="en-US"/>
           </a:p>
@@ -8695,7 +8695,7 @@
           <a:p>
             <a:fld id="{02AC24A9-CCB6-4F8D-B8DB-C2F3692CFA5A}" type="datetimeFigureOut">
               <a:rPr lang="en-US" smtClean="0"/>
-              <a:t>10/9/24</a:t>
+              <a:t>11/4/24</a:t>
             </a:fld>
             <a:endParaRPr lang="en-US"/>
           </a:p>
@@ -9230,7 +9230,7 @@
           <a:p>
             <a:fld id="{02AC24A9-CCB6-4F8D-B8DB-C2F3692CFA5A}" type="datetimeFigureOut">
               <a:rPr lang="en-US" smtClean="0"/>
-              <a:t>10/9/24</a:t>
+              <a:t>11/4/24</a:t>
             </a:fld>
             <a:endParaRPr lang="en-US"/>
           </a:p>
@@ -9932,7 +9932,7 @@
           <a:p>
             <a:fld id="{02AC24A9-CCB6-4F8D-B8DB-C2F3692CFA5A}" type="datetimeFigureOut">
               <a:rPr lang="en-US" smtClean="0"/>
-              <a:t>10/9/24</a:t>
+              <a:t>11/4/24</a:t>
             </a:fld>
             <a:endParaRPr lang="en-US"/>
           </a:p>
@@ -10262,7 +10262,7 @@
           <a:p>
             <a:fld id="{02AC24A9-CCB6-4F8D-B8DB-C2F3692CFA5A}" type="datetimeFigureOut">
               <a:rPr lang="en-US" smtClean="0"/>
-              <a:t>10/9/24</a:t>
+              <a:t>11/4/24</a:t>
             </a:fld>
             <a:endParaRPr lang="en-US"/>
           </a:p>
@@ -10375,7 +10375,7 @@
           <a:p>
             <a:fld id="{02AC24A9-CCB6-4F8D-B8DB-C2F3692CFA5A}" type="datetimeFigureOut">
               <a:rPr lang="en-US" smtClean="0"/>
-              <a:t>10/9/24</a:t>
+              <a:t>11/4/24</a:t>
             </a:fld>
             <a:endParaRPr lang="en-US"/>
           </a:p>
@@ -10872,7 +10872,7 @@
           <a:p>
             <a:fld id="{02AC24A9-CCB6-4F8D-B8DB-C2F3692CFA5A}" type="datetimeFigureOut">
               <a:rPr lang="en-US" smtClean="0"/>
-              <a:t>10/9/24</a:t>
+              <a:t>11/4/24</a:t>
             </a:fld>
             <a:endParaRPr lang="en-US" dirty="0"/>
           </a:p>
@@ -11351,7 +11351,7 @@
           <a:p>
             <a:fld id="{02AC24A9-CCB6-4F8D-B8DB-C2F3692CFA5A}" type="datetimeFigureOut">
               <a:rPr lang="en-US" smtClean="0"/>
-              <a:t>10/9/24</a:t>
+              <a:t>11/4/24</a:t>
             </a:fld>
             <a:endParaRPr lang="en-US"/>
           </a:p>
@@ -11594,7 +11594,7 @@
           <a:p>
             <a:fld id="{02AC24A9-CCB6-4F8D-B8DB-C2F3692CFA5A}" type="datetimeFigureOut">
               <a:rPr lang="en-US" smtClean="0"/>
-              <a:t>10/9/24</a:t>
+              <a:t>11/4/24</a:t>
             </a:fld>
             <a:endParaRPr lang="en-US"/>
           </a:p>
@@ -15316,7 +15316,7 @@
 </file>
 
 <file path=ppt/slides/slide2.xml><?xml version="1.0" encoding="utf-8"?>
-<p:sld xmlns:a="http://schemas.openxmlformats.org/drawingml/2006/main" xmlns:r="http://schemas.openxmlformats.org/officeDocument/2006/relationships" xmlns:p="http://schemas.openxmlformats.org/presentationml/2006/main" show="0">
+<p:sld xmlns:a="http://schemas.openxmlformats.org/drawingml/2006/main" xmlns:r="http://schemas.openxmlformats.org/officeDocument/2006/relationships" xmlns:p="http://schemas.openxmlformats.org/presentationml/2006/main">
   <p:cSld>
     <p:spTree>
       <p:nvGrpSpPr>
@@ -15389,13 +15389,19 @@
           <a:p>
             <a:r>
               <a:rPr lang="en-US" dirty="0"/>
-              <a:t>Related Work </a:t>
+              <a:t>Domain and Architecture Models </a:t>
             </a:r>
           </a:p>
           <a:p>
             <a:r>
               <a:rPr lang="en-US" dirty="0"/>
-              <a:t>Proposed Project and Approach</a:t>
+              <a:t>Demo and code</a:t>
+            </a:r>
+          </a:p>
+          <a:p>
+            <a:r>
+              <a:rPr lang="en-US" dirty="0"/>
+              <a:t>Deliverables</a:t>
             </a:r>
           </a:p>
           <a:p>
@@ -16038,7 +16044,7 @@
           <a:p>
             <a:r>
               <a:rPr lang="en-US" dirty="0"/>
-              <a:t>Deliverables By Stand up</a:t>
+              <a:t>Deliverables By Stand up III</a:t>
             </a:r>
           </a:p>
         </p:txBody>
@@ -16074,19 +16080,24 @@
           <a:p>
             <a:r>
               <a:rPr lang="en-US" dirty="0"/>
-              <a:t>Finalize Forecasting Strategies</a:t>
-            </a:r>
+              <a:t>Finalize </a:t>
+            </a:r>
+            <a:r>
+              <a:rPr lang="en-US"/>
+              <a:t>RL algorithm</a:t>
+            </a:r>
+            <a:endParaRPr lang="en-US" dirty="0"/>
           </a:p>
           <a:p>
             <a:r>
               <a:rPr lang="en-US" dirty="0"/>
-              <a:t>RL Agent algorithms testing</a:t>
+              <a:t>Integration of TSA and RL</a:t>
             </a:r>
           </a:p>
           <a:p>
             <a:r>
               <a:rPr lang="en-US" dirty="0"/>
-              <a:t>Modeling pipeline</a:t>
+              <a:t>Basic UI for the project</a:t>
             </a:r>
           </a:p>
         </p:txBody>
@@ -18855,6 +18866,14 @@
 </file>
 
 <file path=customXml/item2.xml><?xml version="1.0" encoding="utf-8"?>
+<p:properties xmlns:p="http://schemas.microsoft.com/office/2006/metadata/properties" xmlns:xsi="http://www.w3.org/2001/XMLSchema-instance" xmlns:pc="http://schemas.microsoft.com/office/infopath/2007/PartnerControls">
+  <documentManagement>
+    <_activity xmlns="7075bad5-233c-4b0e-9903-8affd2618abc" xsi:nil="true"/>
+  </documentManagement>
+</p:properties>
+</file>
+
+<file path=customXml/item3.xml><?xml version="1.0" encoding="utf-8"?>
 <ct:contentTypeSchema xmlns:ct="http://schemas.microsoft.com/office/2006/metadata/contentType" xmlns:ma="http://schemas.microsoft.com/office/2006/metadata/properties/metaAttributes" ct:_="" ma:_="" ma:contentTypeName="Document" ma:contentTypeID="0x010100FC4FF9440EFC6A459DF57816F4000C67" ma:contentTypeVersion="8" ma:contentTypeDescription="Create a new document." ma:contentTypeScope="" ma:versionID="8a7d90e84126aabbf379449bcd8b03e2">
   <xsd:schema xmlns:xsd="http://www.w3.org/2001/XMLSchema" xmlns:xs="http://www.w3.org/2001/XMLSchema" xmlns:p="http://schemas.microsoft.com/office/2006/metadata/properties" xmlns:ns3="7075bad5-233c-4b0e-9903-8affd2618abc" xmlns:ns4="7fc9a113-5fb1-49ba-90f0-f7064e123786" targetNamespace="http://schemas.microsoft.com/office/2006/metadata/properties" ma:root="true" ma:fieldsID="0389e895a75997c6fee9ec00d2c0ce57" ns3:_="" ns4:_="">
     <xsd:import namespace="7075bad5-233c-4b0e-9903-8affd2618abc"/>
@@ -19043,14 +19062,6 @@
 </ct:contentTypeSchema>
 </file>
 
-<file path=customXml/item3.xml><?xml version="1.0" encoding="utf-8"?>
-<p:properties xmlns:p="http://schemas.microsoft.com/office/2006/metadata/properties" xmlns:xsi="http://www.w3.org/2001/XMLSchema-instance" xmlns:pc="http://schemas.microsoft.com/office/infopath/2007/PartnerControls">
-  <documentManagement>
-    <_activity xmlns="7075bad5-233c-4b0e-9903-8affd2618abc" xsi:nil="true"/>
-  </documentManagement>
-</p:properties>
-</file>
-
 <file path=customXml/itemProps1.xml><?xml version="1.0" encoding="utf-8"?>
 <ds:datastoreItem xmlns:ds="http://schemas.openxmlformats.org/officeDocument/2006/customXml" ds:itemID="{6FA10C29-5137-49FA-9F2D-040C21F563DC}">
   <ds:schemaRefs>
@@ -19060,6 +19071,23 @@
 </file>
 
 <file path=customXml/itemProps2.xml><?xml version="1.0" encoding="utf-8"?>
+<ds:datastoreItem xmlns:ds="http://schemas.openxmlformats.org/officeDocument/2006/customXml" ds:itemID="{1EB1D61D-03E6-4AE6-9AEB-4C0517DF9C10}">
+  <ds:schemaRefs>
+    <ds:schemaRef ds:uri="http://purl.org/dc/terms/"/>
+    <ds:schemaRef ds:uri="http://schemas.microsoft.com/office/infopath/2007/PartnerControls"/>
+    <ds:schemaRef ds:uri="http://purl.org/dc/elements/1.1/"/>
+    <ds:schemaRef ds:uri="http://purl.org/dc/dcmitype/"/>
+    <ds:schemaRef ds:uri="7fc9a113-5fb1-49ba-90f0-f7064e123786"/>
+    <ds:schemaRef ds:uri="http://www.w3.org/XML/1998/namespace"/>
+    <ds:schemaRef ds:uri="http://schemas.microsoft.com/office/2006/documentManagement/types"/>
+    <ds:schemaRef ds:uri="http://schemas.openxmlformats.org/package/2006/metadata/core-properties"/>
+    <ds:schemaRef ds:uri="7075bad5-233c-4b0e-9903-8affd2618abc"/>
+    <ds:schemaRef ds:uri="http://schemas.microsoft.com/office/2006/metadata/properties"/>
+  </ds:schemaRefs>
+</ds:datastoreItem>
+</file>
+
+<file path=customXml/itemProps3.xml><?xml version="1.0" encoding="utf-8"?>
 <ds:datastoreItem xmlns:ds="http://schemas.openxmlformats.org/officeDocument/2006/customXml" ds:itemID="{B8132D64-B6F1-4733-9D89-E2C903EFB4BD}">
   <ds:schemaRefs>
     <ds:schemaRef ds:uri="http://schemas.microsoft.com/office/2006/metadata/contentType"/>
@@ -19078,23 +19106,6 @@
 </ds:datastoreItem>
 </file>
 
-<file path=customXml/itemProps3.xml><?xml version="1.0" encoding="utf-8"?>
-<ds:datastoreItem xmlns:ds="http://schemas.openxmlformats.org/officeDocument/2006/customXml" ds:itemID="{1EB1D61D-03E6-4AE6-9AEB-4C0517DF9C10}">
-  <ds:schemaRefs>
-    <ds:schemaRef ds:uri="http://purl.org/dc/terms/"/>
-    <ds:schemaRef ds:uri="http://schemas.microsoft.com/office/infopath/2007/PartnerControls"/>
-    <ds:schemaRef ds:uri="http://purl.org/dc/elements/1.1/"/>
-    <ds:schemaRef ds:uri="http://purl.org/dc/dcmitype/"/>
-    <ds:schemaRef ds:uri="7fc9a113-5fb1-49ba-90f0-f7064e123786"/>
-    <ds:schemaRef ds:uri="http://www.w3.org/XML/1998/namespace"/>
-    <ds:schemaRef ds:uri="http://schemas.microsoft.com/office/2006/documentManagement/types"/>
-    <ds:schemaRef ds:uri="http://schemas.openxmlformats.org/package/2006/metadata/core-properties"/>
-    <ds:schemaRef ds:uri="7075bad5-233c-4b0e-9903-8affd2618abc"/>
-    <ds:schemaRef ds:uri="http://schemas.microsoft.com/office/2006/metadata/properties"/>
-  </ds:schemaRefs>
-</ds:datastoreItem>
-</file>
-
 <file path=docMetadata/LabelInfo.xml><?xml version="1.0" encoding="utf-8"?>
 <clbl:labelList xmlns:clbl="http://schemas.microsoft.com/office/2020/mipLabelMetadata">
   <clbl:label id="{f9dd8f4f-3b8b-4768-aba7-bbd379e0736b}" enabled="0" method="" siteId="{f9dd8f4f-3b8b-4768-aba7-bbd379e0736b}" removed="1"/>

</xml_diff>